<commit_message>
fix final presentation content style
</commit_message>
<xml_diff>
--- a/final-presentation/final_presentation.pptx
+++ b/final-presentation/final_presentation.pptx
@@ -3372,7 +3372,7 @@
           <a:p>
             <a:fld id="{843A4CAD-2332-440A-B5F3-F5F26A7FAEC2}" type="datetimeFigureOut">
               <a:rPr lang="en-US" smtClean="0"/>
-              <a:t>6/20/2023</a:t>
+              <a:t>6/21/2023</a:t>
             </a:fld>
             <a:endParaRPr lang="en-US"/>
           </a:p>
@@ -9237,7 +9237,7 @@
         </p:blipFill>
         <p:spPr>
           <a:xfrm>
-            <a:off x="4150290" y="-26126"/>
+            <a:off x="4150290" y="-52252"/>
             <a:ext cx="4618495" cy="4659085"/>
           </a:xfrm>
           <a:prstGeom prst="rect">
@@ -9266,8 +9266,8 @@
         </p:nvSpPr>
         <p:spPr>
           <a:xfrm>
-            <a:off x="771525" y="4767262"/>
-            <a:ext cx="4657725" cy="273844"/>
+            <a:off x="4245157" y="4767943"/>
+            <a:ext cx="4330747" cy="375557"/>
           </a:xfrm>
         </p:spPr>
         <p:txBody>
@@ -9285,7 +9285,7 @@
               </a:spcAft>
             </a:pPr>
             <a:r>
-              <a:rPr lang="en-US" sz="800" kern="1200">
+              <a:rPr lang="en-US" kern="1200" dirty="0">
                 <a:solidFill>
                   <a:schemeClr val="tx1">
                     <a:alpha val="80000"/>
@@ -9295,7 +9295,59 @@
                 <a:ea typeface="+mn-ea"/>
                 <a:cs typeface="+mn-cs"/>
               </a:rPr>
-              <a:t>Movie Recommendation Project - Abschlusspräsentation | Bauer, Gisser &amp; Resavac | 21.06.2023</a:t>
+              <a:t>Movie Recommendation Project - </a:t>
+            </a:r>
+            <a:r>
+              <a:rPr lang="en-US" kern="1200" dirty="0" err="1">
+                <a:solidFill>
+                  <a:schemeClr val="tx1">
+                    <a:alpha val="80000"/>
+                  </a:schemeClr>
+                </a:solidFill>
+                <a:latin typeface="+mn-lt"/>
+                <a:ea typeface="+mn-ea"/>
+                <a:cs typeface="+mn-cs"/>
+              </a:rPr>
+              <a:t>Abschlusspräsentation</a:t>
+            </a:r>
+            <a:r>
+              <a:rPr lang="en-US" kern="1200" dirty="0">
+                <a:solidFill>
+                  <a:schemeClr val="tx1">
+                    <a:alpha val="80000"/>
+                  </a:schemeClr>
+                </a:solidFill>
+                <a:latin typeface="+mn-lt"/>
+                <a:ea typeface="+mn-ea"/>
+                <a:cs typeface="+mn-cs"/>
+              </a:rPr>
+              <a:t> | Bauer, Gisser &amp; </a:t>
+            </a:r>
+            <a:r>
+              <a:rPr lang="en-US" kern="1200" dirty="0" err="1">
+                <a:solidFill>
+                  <a:schemeClr val="tx1">
+                    <a:alpha val="80000"/>
+                  </a:schemeClr>
+                </a:solidFill>
+                <a:latin typeface="+mn-lt"/>
+                <a:ea typeface="+mn-ea"/>
+                <a:cs typeface="+mn-cs"/>
+              </a:rPr>
+              <a:t>Resavac</a:t>
+            </a:r>
+            <a:r>
+              <a:rPr lang="en-US" kern="1200" dirty="0">
+                <a:solidFill>
+                  <a:schemeClr val="tx1">
+                    <a:alpha val="80000"/>
+                  </a:schemeClr>
+                </a:solidFill>
+                <a:latin typeface="+mn-lt"/>
+                <a:ea typeface="+mn-ea"/>
+                <a:cs typeface="+mn-cs"/>
+              </a:rPr>
+              <a:t> | 21.06.2023</a:t>
             </a:r>
           </a:p>
         </p:txBody>
@@ -9321,8 +9373,8 @@
         </p:nvSpPr>
         <p:spPr>
           <a:xfrm>
-            <a:off x="8275638" y="4767262"/>
-            <a:ext cx="385761" cy="273844"/>
+            <a:off x="8572980" y="4767943"/>
+            <a:ext cx="446923" cy="375557"/>
           </a:xfrm>
         </p:spPr>
         <p:txBody>
@@ -9340,7 +9392,7 @@
               </a:spcAft>
             </a:pPr>
             <a:fld id="{9C057DB4-583E-41A7-BD94-987342018C17}" type="slidenum">
-              <a:rPr lang="en-US" sz="1200">
+              <a:rPr lang="en-US">
                 <a:solidFill>
                   <a:schemeClr val="tx1">
                     <a:alpha val="80000"/>
@@ -9357,7 +9409,7 @@
               </a:pPr>
               <a:t>3</a:t>
             </a:fld>
-            <a:endParaRPr lang="en-US" sz="1200">
+            <a:endParaRPr lang="en-US" dirty="0">
               <a:solidFill>
                 <a:schemeClr val="tx1">
                   <a:alpha val="80000"/>
@@ -9846,10 +9898,25 @@
           <a:lstStyle/>
           <a:p>
             <a:r>
-              <a:rPr lang="en-GB"/>
-              <a:t>Movie Recommendation Project - Abschlusspräsentation | Bauer, Gisser &amp; Resavac | 21.06.2023</a:t>
-            </a:r>
-            <a:endParaRPr lang="en-GB" dirty="0"/>
+              <a:rPr lang="en-GB" dirty="0"/>
+              <a:t>Movie Recommendation Project - </a:t>
+            </a:r>
+            <a:r>
+              <a:rPr lang="en-GB" dirty="0" err="1"/>
+              <a:t>Abschlusspräsentation</a:t>
+            </a:r>
+            <a:r>
+              <a:rPr lang="en-GB" dirty="0"/>
+              <a:t> | Bauer, Gisser &amp; </a:t>
+            </a:r>
+            <a:r>
+              <a:rPr lang="en-GB" dirty="0" err="1"/>
+              <a:t>Resavac</a:t>
+            </a:r>
+            <a:r>
+              <a:rPr lang="en-GB" dirty="0"/>
+              <a:t> | 21.06.2023</a:t>
+            </a:r>
           </a:p>
         </p:txBody>
       </p:sp>

</xml_diff>